<commit_message>
just lack of 2 details windows and decoration for enseignants
</commit_message>
<xml_diff>
--- a/img/新建 Microsoft PowerPoint 演示文稿.pptx
+++ b/img/新建 Microsoft PowerPoint 演示文稿.pptx
@@ -292,7 +292,7 @@
           <a:p>
             <a:fld id="{530820CF-B880-4189-942D-D702A7CBA730}" type="datetimeFigureOut">
               <a:rPr lang="zh-CN" altLang="en-US" smtClean="0"/>
-              <a:t>2018/5/27</a:t>
+              <a:t>2018/6/3</a:t>
             </a:fld>
             <a:endParaRPr lang="zh-CN" altLang="en-US"/>
           </a:p>
@@ -457,7 +457,7 @@
           <a:p>
             <a:fld id="{530820CF-B880-4189-942D-D702A7CBA730}" type="datetimeFigureOut">
               <a:rPr lang="zh-CN" altLang="en-US" smtClean="0"/>
-              <a:t>2018/5/27</a:t>
+              <a:t>2018/6/3</a:t>
             </a:fld>
             <a:endParaRPr lang="zh-CN" altLang="en-US"/>
           </a:p>
@@ -632,7 +632,7 @@
           <a:p>
             <a:fld id="{530820CF-B880-4189-942D-D702A7CBA730}" type="datetimeFigureOut">
               <a:rPr lang="zh-CN" altLang="en-US" smtClean="0"/>
-              <a:t>2018/5/27</a:t>
+              <a:t>2018/6/3</a:t>
             </a:fld>
             <a:endParaRPr lang="zh-CN" altLang="en-US"/>
           </a:p>
@@ -797,7 +797,7 @@
           <a:p>
             <a:fld id="{530820CF-B880-4189-942D-D702A7CBA730}" type="datetimeFigureOut">
               <a:rPr lang="zh-CN" altLang="en-US" smtClean="0"/>
-              <a:t>2018/5/27</a:t>
+              <a:t>2018/6/3</a:t>
             </a:fld>
             <a:endParaRPr lang="zh-CN" altLang="en-US"/>
           </a:p>
@@ -1038,7 +1038,7 @@
           <a:p>
             <a:fld id="{530820CF-B880-4189-942D-D702A7CBA730}" type="datetimeFigureOut">
               <a:rPr lang="zh-CN" altLang="en-US" smtClean="0"/>
-              <a:t>2018/5/27</a:t>
+              <a:t>2018/6/3</a:t>
             </a:fld>
             <a:endParaRPr lang="zh-CN" altLang="en-US"/>
           </a:p>
@@ -1321,7 +1321,7 @@
           <a:p>
             <a:fld id="{530820CF-B880-4189-942D-D702A7CBA730}" type="datetimeFigureOut">
               <a:rPr lang="zh-CN" altLang="en-US" smtClean="0"/>
-              <a:t>2018/5/27</a:t>
+              <a:t>2018/6/3</a:t>
             </a:fld>
             <a:endParaRPr lang="zh-CN" altLang="en-US"/>
           </a:p>
@@ -1738,7 +1738,7 @@
           <a:p>
             <a:fld id="{530820CF-B880-4189-942D-D702A7CBA730}" type="datetimeFigureOut">
               <a:rPr lang="zh-CN" altLang="en-US" smtClean="0"/>
-              <a:t>2018/5/27</a:t>
+              <a:t>2018/6/3</a:t>
             </a:fld>
             <a:endParaRPr lang="zh-CN" altLang="en-US"/>
           </a:p>
@@ -1851,7 +1851,7 @@
           <a:p>
             <a:fld id="{530820CF-B880-4189-942D-D702A7CBA730}" type="datetimeFigureOut">
               <a:rPr lang="zh-CN" altLang="en-US" smtClean="0"/>
-              <a:t>2018/5/27</a:t>
+              <a:t>2018/6/3</a:t>
             </a:fld>
             <a:endParaRPr lang="zh-CN" altLang="en-US"/>
           </a:p>
@@ -1941,7 +1941,7 @@
           <a:p>
             <a:fld id="{530820CF-B880-4189-942D-D702A7CBA730}" type="datetimeFigureOut">
               <a:rPr lang="zh-CN" altLang="en-US" smtClean="0"/>
-              <a:t>2018/5/27</a:t>
+              <a:t>2018/6/3</a:t>
             </a:fld>
             <a:endParaRPr lang="zh-CN" altLang="en-US"/>
           </a:p>
@@ -2213,7 +2213,7 @@
           <a:p>
             <a:fld id="{530820CF-B880-4189-942D-D702A7CBA730}" type="datetimeFigureOut">
               <a:rPr lang="zh-CN" altLang="en-US" smtClean="0"/>
-              <a:t>2018/5/27</a:t>
+              <a:t>2018/6/3</a:t>
             </a:fld>
             <a:endParaRPr lang="zh-CN" altLang="en-US"/>
           </a:p>
@@ -2461,7 +2461,7 @@
           <a:p>
             <a:fld id="{530820CF-B880-4189-942D-D702A7CBA730}" type="datetimeFigureOut">
               <a:rPr lang="zh-CN" altLang="en-US" smtClean="0"/>
-              <a:t>2018/5/27</a:t>
+              <a:t>2018/6/3</a:t>
             </a:fld>
             <a:endParaRPr lang="zh-CN" altLang="en-US"/>
           </a:p>
@@ -2669,7 +2669,7 @@
           <a:p>
             <a:fld id="{530820CF-B880-4189-942D-D702A7CBA730}" type="datetimeFigureOut">
               <a:rPr lang="zh-CN" altLang="en-US" smtClean="0"/>
-              <a:t>2018/5/27</a:t>
+              <a:t>2018/6/3</a:t>
             </a:fld>
             <a:endParaRPr lang="zh-CN" altLang="en-US"/>
           </a:p>
@@ -3039,6 +3039,626 @@
           <a:chExt cx="0" cy="0"/>
         </a:xfrm>
       </p:grpSpPr>
+      <p:graphicFrame>
+        <p:nvGraphicFramePr>
+          <p:cNvPr id="2" name="表格 1"/>
+          <p:cNvGraphicFramePr>
+            <a:graphicFrameLocks noGrp="1"/>
+          </p:cNvGraphicFramePr>
+          <p:nvPr>
+            <p:extLst>
+              <p:ext uri="{D42A27DB-BD31-4B8C-83A1-F6EECF244321}">
+                <p14:modId xmlns:p14="http://schemas.microsoft.com/office/powerpoint/2010/main" val="696717545"/>
+              </p:ext>
+            </p:extLst>
+          </p:nvPr>
+        </p:nvGraphicFramePr>
+        <p:xfrm>
+          <a:off x="971600" y="1700808"/>
+          <a:ext cx="4032448" cy="1483360"/>
+        </p:xfrm>
+        <a:graphic>
+          <a:graphicData uri="http://schemas.openxmlformats.org/drawingml/2006/table">
+            <a:tbl>
+              <a:tblPr firstRow="1" bandRow="1">
+                <a:tableStyleId>{5C22544A-7EE6-4342-B048-85BDC9FD1C3A}</a:tableStyleId>
+              </a:tblPr>
+              <a:tblGrid>
+                <a:gridCol w="504056"/>
+                <a:gridCol w="864096"/>
+                <a:gridCol w="864096"/>
+                <a:gridCol w="648072"/>
+                <a:gridCol w="648072"/>
+                <a:gridCol w="504056"/>
+              </a:tblGrid>
+              <a:tr h="370840">
+                <a:tc>
+                  <a:txBody>
+                    <a:bodyPr/>
+                    <a:lstStyle/>
+                    <a:p>
+                      <a:pPr algn="ctr"/>
+                      <a:r>
+                        <a:rPr lang="en-US" altLang="zh-CN" sz="1600" dirty="0" err="1" smtClean="0"/>
+                        <a:t>Nss</a:t>
+                      </a:r>
+                      <a:endParaRPr lang="zh-CN" altLang="en-US" sz="1600" dirty="0"/>
+                    </a:p>
+                  </a:txBody>
+                  <a:tcPr/>
+                </a:tc>
+                <a:tc>
+                  <a:txBody>
+                    <a:bodyPr/>
+                    <a:lstStyle/>
+                    <a:p>
+                      <a:pPr algn="ctr"/>
+                      <a:r>
+                        <a:rPr lang="en-US" altLang="zh-CN" sz="1600" dirty="0" err="1" smtClean="0"/>
+                        <a:t>Prenom</a:t>
+                      </a:r>
+                      <a:endParaRPr lang="zh-CN" altLang="en-US" sz="1600" dirty="0"/>
+                    </a:p>
+                  </a:txBody>
+                  <a:tcPr/>
+                </a:tc>
+                <a:tc>
+                  <a:txBody>
+                    <a:bodyPr/>
+                    <a:lstStyle/>
+                    <a:p>
+                      <a:pPr algn="ctr"/>
+                      <a:r>
+                        <a:rPr lang="en-US" altLang="zh-CN" sz="1600" dirty="0" smtClean="0"/>
+                        <a:t>Nom</a:t>
+                      </a:r>
+                      <a:endParaRPr lang="zh-CN" altLang="en-US" sz="1600" dirty="0"/>
+                    </a:p>
+                  </a:txBody>
+                  <a:tcPr/>
+                </a:tc>
+                <a:tc>
+                  <a:txBody>
+                    <a:bodyPr/>
+                    <a:lstStyle/>
+                    <a:p>
+                      <a:pPr algn="ctr"/>
+                      <a:r>
+                        <a:rPr lang="en-US" altLang="zh-CN" sz="1600" dirty="0" smtClean="0"/>
+                        <a:t>UV1</a:t>
+                      </a:r>
+                      <a:endParaRPr lang="zh-CN" altLang="en-US" sz="1600" dirty="0"/>
+                    </a:p>
+                  </a:txBody>
+                  <a:tcPr/>
+                </a:tc>
+                <a:tc>
+                  <a:txBody>
+                    <a:bodyPr/>
+                    <a:lstStyle/>
+                    <a:p>
+                      <a:pPr algn="ctr"/>
+                      <a:r>
+                        <a:rPr lang="en-US" altLang="zh-CN" sz="1600" dirty="0" smtClean="0"/>
+                        <a:t>UV2</a:t>
+                      </a:r>
+                      <a:endParaRPr lang="zh-CN" altLang="en-US" sz="1600" dirty="0"/>
+                    </a:p>
+                  </a:txBody>
+                  <a:tcPr/>
+                </a:tc>
+                <a:tc>
+                  <a:txBody>
+                    <a:bodyPr/>
+                    <a:lstStyle/>
+                    <a:p>
+                      <a:pPr algn="ctr"/>
+                      <a:r>
+                        <a:rPr lang="en-US" altLang="zh-CN" sz="1600" dirty="0" smtClean="0"/>
+                        <a:t>...</a:t>
+                      </a:r>
+                      <a:endParaRPr lang="zh-CN" altLang="en-US" sz="1600" dirty="0"/>
+                    </a:p>
+                  </a:txBody>
+                  <a:tcPr/>
+                </a:tc>
+              </a:tr>
+              <a:tr h="370840">
+                <a:tc>
+                  <a:txBody>
+                    <a:bodyPr/>
+                    <a:lstStyle/>
+                    <a:p>
+                      <a:pPr algn="ctr" fontAlgn="ctr"/>
+                      <a:r>
+                        <a:rPr lang="en-US" altLang="zh-CN" sz="1400" u="none" strike="noStrike" dirty="0" smtClean="0">
+                          <a:effectLst/>
+                        </a:rPr>
+                        <a:t>99997</a:t>
+                      </a:r>
+                      <a:endParaRPr lang="en-US" altLang="zh-CN" sz="1400" b="0" i="0" u="none" strike="noStrike" dirty="0">
+                        <a:solidFill>
+                          <a:srgbClr val="000000"/>
+                        </a:solidFill>
+                        <a:effectLst/>
+                        <a:latin typeface="宋体"/>
+                      </a:endParaRPr>
+                    </a:p>
+                  </a:txBody>
+                  <a:tcPr marL="9525" marR="9525" marT="9525" marB="0" anchor="ctr"/>
+                </a:tc>
+                <a:tc>
+                  <a:txBody>
+                    <a:bodyPr/>
+                    <a:lstStyle/>
+                    <a:p>
+                      <a:pPr algn="ctr" fontAlgn="ctr"/>
+                      <a:r>
+                        <a:rPr lang="en-US" sz="1400" u="none" strike="noStrike" dirty="0" smtClean="0">
+                          <a:effectLst/>
+                        </a:rPr>
+                        <a:t>Sophie</a:t>
+                      </a:r>
+                      <a:endParaRPr lang="en-US" sz="1400" b="0" i="0" u="none" strike="noStrike" dirty="0">
+                        <a:solidFill>
+                          <a:srgbClr val="000000"/>
+                        </a:solidFill>
+                        <a:effectLst/>
+                        <a:latin typeface="宋体"/>
+                      </a:endParaRPr>
+                    </a:p>
+                  </a:txBody>
+                  <a:tcPr marL="9525" marR="9525" marT="9525" marB="0" anchor="ctr"/>
+                </a:tc>
+                <a:tc>
+                  <a:txBody>
+                    <a:bodyPr/>
+                    <a:lstStyle/>
+                    <a:p>
+                      <a:pPr algn="ctr" fontAlgn="ctr"/>
+                      <a:r>
+                        <a:rPr lang="en-US" sz="1400" u="none" strike="noStrike" dirty="0" smtClean="0">
+                          <a:effectLst/>
+                        </a:rPr>
+                        <a:t>LORIETTE </a:t>
+                      </a:r>
+                      <a:endParaRPr lang="en-US" sz="1400" b="0" i="0" u="none" strike="noStrike" dirty="0">
+                        <a:solidFill>
+                          <a:srgbClr val="000000"/>
+                        </a:solidFill>
+                        <a:effectLst/>
+                        <a:latin typeface="宋体"/>
+                      </a:endParaRPr>
+                    </a:p>
+                  </a:txBody>
+                  <a:tcPr marL="9525" marR="9525" marT="9525" marB="0" anchor="ctr"/>
+                </a:tc>
+                <a:tc>
+                  <a:txBody>
+                    <a:bodyPr/>
+                    <a:lstStyle/>
+                    <a:p>
+                      <a:pPr algn="ctr" fontAlgn="ctr"/>
+                      <a:r>
+                        <a:rPr lang="en-US" sz="1400" u="none" strike="noStrike" dirty="0" smtClean="0">
+                          <a:effectLst/>
+                        </a:rPr>
+                        <a:t>NF16</a:t>
+                      </a:r>
+                      <a:endParaRPr lang="en-US" sz="1400" b="0" i="0" u="none" strike="noStrike" dirty="0">
+                        <a:solidFill>
+                          <a:srgbClr val="000000"/>
+                        </a:solidFill>
+                        <a:effectLst/>
+                        <a:latin typeface="宋体"/>
+                      </a:endParaRPr>
+                    </a:p>
+                  </a:txBody>
+                  <a:tcPr marL="9525" marR="9525" marT="9525" marB="0" anchor="ctr"/>
+                </a:tc>
+                <a:tc>
+                  <a:txBody>
+                    <a:bodyPr/>
+                    <a:lstStyle/>
+                    <a:p>
+                      <a:pPr algn="ctr" fontAlgn="ctr"/>
+                      <a:r>
+                        <a:rPr lang="en-US" sz="1400" u="none" strike="noStrike" dirty="0">
+                          <a:effectLst/>
+                        </a:rPr>
+                        <a:t>LO12</a:t>
+                      </a:r>
+                      <a:endParaRPr lang="en-US" sz="1400" b="0" i="0" u="none" strike="noStrike" dirty="0">
+                        <a:solidFill>
+                          <a:srgbClr val="000000"/>
+                        </a:solidFill>
+                        <a:effectLst/>
+                        <a:latin typeface="宋体"/>
+                      </a:endParaRPr>
+                    </a:p>
+                  </a:txBody>
+                  <a:tcPr marL="9525" marR="9525" marT="9525" marB="0" anchor="ctr"/>
+                </a:tc>
+                <a:tc>
+                  <a:txBody>
+                    <a:bodyPr/>
+                    <a:lstStyle/>
+                    <a:p>
+                      <a:pPr algn="ctr" fontAlgn="ctr"/>
+                      <a:endParaRPr lang="en-US" sz="1400" b="0" i="0" u="none" strike="noStrike" dirty="0">
+                        <a:solidFill>
+                          <a:srgbClr val="000000"/>
+                        </a:solidFill>
+                        <a:effectLst/>
+                        <a:latin typeface="宋体"/>
+                      </a:endParaRPr>
+                    </a:p>
+                  </a:txBody>
+                  <a:tcPr marL="9525" marR="9525" marT="9525" marB="0" anchor="ctr"/>
+                </a:tc>
+              </a:tr>
+              <a:tr h="370840">
+                <a:tc>
+                  <a:txBody>
+                    <a:bodyPr/>
+                    <a:lstStyle/>
+                    <a:p>
+                      <a:pPr algn="ctr" fontAlgn="ctr"/>
+                      <a:r>
+                        <a:rPr lang="en-US" altLang="zh-CN" sz="1400" u="none" strike="noStrike" dirty="0" smtClean="0">
+                          <a:effectLst/>
+                        </a:rPr>
+                        <a:t>99998</a:t>
+                      </a:r>
+                      <a:endParaRPr lang="en-US" altLang="zh-CN" sz="1400" b="0" i="0" u="none" strike="noStrike" dirty="0">
+                        <a:solidFill>
+                          <a:srgbClr val="000000"/>
+                        </a:solidFill>
+                        <a:effectLst/>
+                        <a:latin typeface="宋体"/>
+                      </a:endParaRPr>
+                    </a:p>
+                  </a:txBody>
+                  <a:tcPr marL="9525" marR="9525" marT="9525" marB="0" anchor="ctr"/>
+                </a:tc>
+                <a:tc>
+                  <a:txBody>
+                    <a:bodyPr/>
+                    <a:lstStyle/>
+                    <a:p>
+                      <a:pPr algn="ctr" fontAlgn="ctr"/>
+                      <a:r>
+                        <a:rPr lang="en-US" sz="1400" u="none" strike="noStrike" dirty="0" smtClean="0">
+                          <a:effectLst/>
+                        </a:rPr>
+                        <a:t>Marc</a:t>
+                      </a:r>
+                      <a:endParaRPr lang="en-US" sz="1400" b="0" i="0" u="none" strike="noStrike" dirty="0">
+                        <a:solidFill>
+                          <a:srgbClr val="000000"/>
+                        </a:solidFill>
+                        <a:effectLst/>
+                        <a:latin typeface="宋体"/>
+                      </a:endParaRPr>
+                    </a:p>
+                  </a:txBody>
+                  <a:tcPr marL="9525" marR="9525" marT="9525" marB="0" anchor="ctr"/>
+                </a:tc>
+                <a:tc>
+                  <a:txBody>
+                    <a:bodyPr/>
+                    <a:lstStyle/>
+                    <a:p>
+                      <a:pPr algn="ctr" fontAlgn="ctr"/>
+                      <a:r>
+                        <a:rPr lang="en-US" sz="1400" b="0" i="0" u="none" strike="noStrike" dirty="0" smtClean="0">
+                          <a:solidFill>
+                            <a:schemeClr val="dk1"/>
+                          </a:solidFill>
+                          <a:effectLst/>
+                          <a:latin typeface="+mn-lt"/>
+                        </a:rPr>
+                        <a:t>LEMERCIER</a:t>
+                      </a:r>
+                      <a:endParaRPr lang="en-US" sz="1400" b="0" i="0" u="none" strike="noStrike" dirty="0">
+                        <a:solidFill>
+                          <a:srgbClr val="000000"/>
+                        </a:solidFill>
+                        <a:effectLst/>
+                        <a:latin typeface="宋体"/>
+                      </a:endParaRPr>
+                    </a:p>
+                  </a:txBody>
+                  <a:tcPr marL="9525" marR="9525" marT="9525" marB="0" anchor="ctr"/>
+                </a:tc>
+                <a:tc>
+                  <a:txBody>
+                    <a:bodyPr/>
+                    <a:lstStyle/>
+                    <a:p>
+                      <a:pPr algn="ctr" fontAlgn="ctr"/>
+                      <a:r>
+                        <a:rPr lang="en-US" sz="1400" u="none" strike="noStrike" dirty="0">
+                          <a:effectLst/>
+                        </a:rPr>
+                        <a:t>NF19</a:t>
+                      </a:r>
+                      <a:endParaRPr lang="en-US" sz="1400" b="0" i="0" u="none" strike="noStrike" dirty="0">
+                        <a:solidFill>
+                          <a:srgbClr val="000000"/>
+                        </a:solidFill>
+                        <a:effectLst/>
+                        <a:latin typeface="宋体"/>
+                      </a:endParaRPr>
+                    </a:p>
+                  </a:txBody>
+                  <a:tcPr marL="9525" marR="9525" marT="9525" marB="0" anchor="ctr"/>
+                </a:tc>
+                <a:tc>
+                  <a:txBody>
+                    <a:bodyPr/>
+                    <a:lstStyle/>
+                    <a:p>
+                      <a:pPr algn="ctr" fontAlgn="ctr"/>
+                      <a:r>
+                        <a:rPr lang="en-US" sz="1400" u="none" strike="noStrike">
+                          <a:effectLst/>
+                        </a:rPr>
+                        <a:t>LO07</a:t>
+                      </a:r>
+                      <a:endParaRPr lang="en-US" sz="1400" b="0" i="0" u="none" strike="noStrike">
+                        <a:solidFill>
+                          <a:srgbClr val="000000"/>
+                        </a:solidFill>
+                        <a:effectLst/>
+                        <a:latin typeface="宋体"/>
+                      </a:endParaRPr>
+                    </a:p>
+                  </a:txBody>
+                  <a:tcPr marL="9525" marR="9525" marT="9525" marB="0" anchor="ctr"/>
+                </a:tc>
+                <a:tc>
+                  <a:txBody>
+                    <a:bodyPr/>
+                    <a:lstStyle/>
+                    <a:p>
+                      <a:pPr algn="ctr" fontAlgn="ctr"/>
+                      <a:endParaRPr lang="en-US" sz="1400" b="0" i="0" u="none" strike="noStrike" dirty="0">
+                        <a:solidFill>
+                          <a:srgbClr val="000000"/>
+                        </a:solidFill>
+                        <a:effectLst/>
+                        <a:latin typeface="宋体"/>
+                      </a:endParaRPr>
+                    </a:p>
+                  </a:txBody>
+                  <a:tcPr marL="9525" marR="9525" marT="9525" marB="0" anchor="ctr"/>
+                </a:tc>
+              </a:tr>
+              <a:tr h="370840">
+                <a:tc>
+                  <a:txBody>
+                    <a:bodyPr/>
+                    <a:lstStyle/>
+                    <a:p>
+                      <a:pPr algn="ctr" fontAlgn="ctr"/>
+                      <a:r>
+                        <a:rPr lang="en-US" altLang="zh-CN" sz="1400" u="none" strike="noStrike" dirty="0">
+                          <a:effectLst/>
+                        </a:rPr>
+                        <a:t>99999</a:t>
+                      </a:r>
+                      <a:endParaRPr lang="en-US" altLang="zh-CN" sz="1400" b="0" i="0" u="none" strike="noStrike" dirty="0">
+                        <a:solidFill>
+                          <a:srgbClr val="000000"/>
+                        </a:solidFill>
+                        <a:effectLst/>
+                        <a:latin typeface="宋体"/>
+                      </a:endParaRPr>
+                    </a:p>
+                  </a:txBody>
+                  <a:tcPr marL="9525" marR="9525" marT="9525" marB="0" anchor="ctr"/>
+                </a:tc>
+                <a:tc>
+                  <a:txBody>
+                    <a:bodyPr/>
+                    <a:lstStyle/>
+                    <a:p>
+                      <a:pPr marL="0" marR="0" indent="0" algn="ctr" defTabSz="914400" rtl="0" eaLnBrk="1" fontAlgn="ctr" latinLnBrk="0" hangingPunct="1">
+                        <a:lnSpc>
+                          <a:spcPct val="100000"/>
+                        </a:lnSpc>
+                        <a:spcBef>
+                          <a:spcPts val="0"/>
+                        </a:spcBef>
+                        <a:spcAft>
+                          <a:spcPts val="0"/>
+                        </a:spcAft>
+                        <a:buClrTx/>
+                        <a:buSzTx/>
+                        <a:buFontTx/>
+                        <a:buNone/>
+                        <a:tabLst/>
+                        <a:defRPr/>
+                      </a:pPr>
+                      <a:r>
+                        <a:rPr lang="en-US" altLang="zh-CN" sz="1400" u="none" strike="noStrike" dirty="0" smtClean="0">
+                          <a:effectLst/>
+                        </a:rPr>
+                        <a:t>jean-marc</a:t>
+                      </a:r>
+                      <a:endParaRPr lang="en-US" altLang="zh-CN" sz="1400" b="0" i="0" u="none" strike="noStrike" dirty="0" smtClean="0">
+                        <a:solidFill>
+                          <a:srgbClr val="000000"/>
+                        </a:solidFill>
+                        <a:effectLst/>
+                        <a:latin typeface="宋体"/>
+                      </a:endParaRPr>
+                    </a:p>
+                  </a:txBody>
+                  <a:tcPr marL="9525" marR="9525" marT="9525" marB="0" anchor="ctr"/>
+                </a:tc>
+                <a:tc>
+                  <a:txBody>
+                    <a:bodyPr/>
+                    <a:lstStyle/>
+                    <a:p>
+                      <a:pPr marL="0" marR="0" indent="0" algn="ctr" defTabSz="914400" rtl="0" eaLnBrk="1" fontAlgn="ctr" latinLnBrk="0" hangingPunct="1">
+                        <a:lnSpc>
+                          <a:spcPct val="100000"/>
+                        </a:lnSpc>
+                        <a:spcBef>
+                          <a:spcPts val="0"/>
+                        </a:spcBef>
+                        <a:spcAft>
+                          <a:spcPts val="0"/>
+                        </a:spcAft>
+                        <a:buClrTx/>
+                        <a:buSzTx/>
+                        <a:buFontTx/>
+                        <a:buNone/>
+                        <a:tabLst/>
+                        <a:defRPr/>
+                      </a:pPr>
+                      <a:r>
+                        <a:rPr lang="en-US" altLang="zh-CN" sz="1400" u="none" strike="noStrike" dirty="0" err="1" smtClean="0">
+                          <a:effectLst/>
+                        </a:rPr>
+                        <a:t>Nigro</a:t>
+                      </a:r>
+                      <a:endParaRPr lang="en-US" altLang="zh-CN" sz="1400" u="none" strike="noStrike" dirty="0" smtClean="0">
+                        <a:effectLst/>
+                      </a:endParaRPr>
+                    </a:p>
+                  </a:txBody>
+                  <a:tcPr marL="9525" marR="9525" marT="9525" marB="0" anchor="ctr"/>
+                </a:tc>
+                <a:tc>
+                  <a:txBody>
+                    <a:bodyPr/>
+                    <a:lstStyle/>
+                    <a:p>
+                      <a:pPr algn="ctr" fontAlgn="ctr"/>
+                      <a:r>
+                        <a:rPr lang="en-US" sz="1400" u="none" strike="noStrike" dirty="0">
+                          <a:effectLst/>
+                        </a:rPr>
+                        <a:t>EG23</a:t>
+                      </a:r>
+                      <a:endParaRPr lang="en-US" sz="1400" b="0" i="0" u="none" strike="noStrike" dirty="0">
+                        <a:solidFill>
+                          <a:srgbClr val="000000"/>
+                        </a:solidFill>
+                        <a:effectLst/>
+                        <a:latin typeface="宋体"/>
+                      </a:endParaRPr>
+                    </a:p>
+                  </a:txBody>
+                  <a:tcPr marL="9525" marR="9525" marT="9525" marB="0" anchor="ctr"/>
+                </a:tc>
+                <a:tc>
+                  <a:txBody>
+                    <a:bodyPr/>
+                    <a:lstStyle/>
+                    <a:p>
+                      <a:pPr algn="ctr" fontAlgn="ctr"/>
+                      <a:endParaRPr lang="en-US" sz="1400" b="0" i="0" u="none" strike="noStrike" dirty="0">
+                        <a:solidFill>
+                          <a:srgbClr val="000000"/>
+                        </a:solidFill>
+                        <a:effectLst/>
+                        <a:latin typeface="宋体"/>
+                      </a:endParaRPr>
+                    </a:p>
+                  </a:txBody>
+                  <a:tcPr marL="9525" marR="9525" marT="9525" marB="0" anchor="ctr"/>
+                </a:tc>
+                <a:tc>
+                  <a:txBody>
+                    <a:bodyPr/>
+                    <a:lstStyle/>
+                    <a:p>
+                      <a:pPr algn="ctr" fontAlgn="ctr"/>
+                      <a:endParaRPr lang="en-US" sz="1400" b="0" i="0" u="none" strike="noStrike" dirty="0">
+                        <a:solidFill>
+                          <a:srgbClr val="000000"/>
+                        </a:solidFill>
+                        <a:effectLst/>
+                        <a:latin typeface="宋体"/>
+                      </a:endParaRPr>
+                    </a:p>
+                  </a:txBody>
+                  <a:tcPr marL="9525" marR="9525" marT="9525" marB="0" anchor="ctr"/>
+                </a:tc>
+              </a:tr>
+            </a:tbl>
+          </a:graphicData>
+        </a:graphic>
+      </p:graphicFrame>
+      <p:pic>
+        <p:nvPicPr>
+          <p:cNvPr id="2051" name="Picture 3"/>
+          <p:cNvPicPr>
+            <a:picLocks noChangeAspect="1" noChangeArrowheads="1"/>
+          </p:cNvPicPr>
+          <p:nvPr/>
+        </p:nvPicPr>
+        <p:blipFill>
+          <a:blip r:embed="rId2">
+            <a:extLst>
+              <a:ext uri="{28A0092B-C50C-407E-A947-70E740481C1C}">
+                <a14:useLocalDpi xmlns:a14="http://schemas.microsoft.com/office/drawing/2010/main" val="0"/>
+              </a:ext>
+            </a:extLst>
+          </a:blip>
+          <a:srcRect/>
+          <a:stretch>
+            <a:fillRect/>
+          </a:stretch>
+        </p:blipFill>
+        <p:spPr bwMode="auto">
+          <a:xfrm>
+            <a:off x="3059832" y="3432175"/>
+            <a:ext cx="4035425" cy="1536700"/>
+          </a:xfrm>
+          <a:prstGeom prst="rect">
+            <a:avLst/>
+          </a:prstGeom>
+          <a:noFill/>
+          <a:ln>
+            <a:noFill/>
+          </a:ln>
+          <a:effectLst/>
+          <a:extLst>
+            <a:ext uri="{909E8E84-426E-40DD-AFC4-6F175D3DCCD1}">
+              <a14:hiddenFill xmlns:a14="http://schemas.microsoft.com/office/drawing/2010/main">
+                <a:solidFill>
+                  <a:schemeClr val="accent1"/>
+                </a:solidFill>
+              </a14:hiddenFill>
+            </a:ext>
+            <a:ext uri="{91240B29-F687-4F45-9708-019B960494DF}">
+              <a14:hiddenLine xmlns:a14="http://schemas.microsoft.com/office/drawing/2010/main" w="9525">
+                <a:solidFill>
+                  <a:schemeClr val="tx1"/>
+                </a:solidFill>
+                <a:miter lim="800000"/>
+                <a:headEnd/>
+                <a:tailEnd/>
+              </a14:hiddenLine>
+            </a:ext>
+            <a:ext uri="{AF507438-7753-43E0-B8FC-AC1667EBCBE1}">
+              <a14:hiddenEffects xmlns:a14="http://schemas.microsoft.com/office/drawing/2010/main">
+                <a:effectLst>
+                  <a:outerShdw dist="35921" dir="2700000" algn="ctr" rotWithShape="0">
+                    <a:schemeClr val="bg2"/>
+                  </a:outerShdw>
+                </a:effectLst>
+              </a14:hiddenEffects>
+            </a:ext>
+          </a:extLst>
+        </p:spPr>
+      </p:pic>
     </p:spTree>
     <p:extLst>
       <p:ext uri="{BB962C8B-B14F-4D97-AF65-F5344CB8AC3E}">
@@ -6043,12 +6663,12 @@
                     <a:p>
                       <a:pPr algn="ctr" fontAlgn="ctr"/>
                       <a:r>
-                        <a:rPr lang="en-US" sz="1400" u="none" strike="noStrike">
+                        <a:rPr lang="en-US" sz="1400" u="none" strike="noStrike" dirty="0" err="1">
                           <a:effectLst/>
                         </a:rPr>
                         <a:t>ZhiQi</a:t>
                       </a:r>
-                      <a:endParaRPr lang="en-US" sz="1400" b="0" i="0" u="none" strike="noStrike">
+                      <a:endParaRPr lang="en-US" sz="1400" b="0" i="0" u="none" strike="noStrike" dirty="0">
                         <a:solidFill>
                           <a:srgbClr val="000000"/>
                         </a:solidFill>
@@ -6246,12 +6866,12 @@
                     <a:p>
                       <a:pPr algn="ctr" fontAlgn="ctr"/>
                       <a:r>
-                        <a:rPr lang="en-US" sz="1400" u="none" strike="noStrike">
+                        <a:rPr lang="en-US" sz="1400" u="none" strike="noStrike" dirty="0">
                           <a:effectLst/>
                         </a:rPr>
                         <a:t>ST09</a:t>
                       </a:r>
-                      <a:endParaRPr lang="en-US" sz="1400" b="0" i="0" u="none" strike="noStrike">
+                      <a:endParaRPr lang="en-US" sz="1400" b="0" i="0" u="none" strike="noStrike" dirty="0">
                         <a:solidFill>
                           <a:srgbClr val="000000"/>
                         </a:solidFill>
@@ -6556,7 +7176,7 @@
         </p:blipFill>
         <p:spPr bwMode="auto">
           <a:xfrm>
-            <a:off x="3540030" y="4149080"/>
+            <a:off x="2267744" y="4365104"/>
             <a:ext cx="5621337" cy="1676400"/>
           </a:xfrm>
           <a:prstGeom prst="rect">
@@ -6627,6 +7247,308 @@
           <a:chExt cx="0" cy="0"/>
         </a:xfrm>
       </p:grpSpPr>
+      <p:pic>
+        <p:nvPicPr>
+          <p:cNvPr id="1029" name="Picture 5"/>
+          <p:cNvPicPr>
+            <a:picLocks noChangeAspect="1" noChangeArrowheads="1"/>
+          </p:cNvPicPr>
+          <p:nvPr/>
+        </p:nvPicPr>
+        <p:blipFill>
+          <a:blip r:embed="rId2">
+            <a:extLst>
+              <a:ext uri="{28A0092B-C50C-407E-A947-70E740481C1C}">
+                <a14:useLocalDpi xmlns:a14="http://schemas.microsoft.com/office/drawing/2010/main" val="0"/>
+              </a:ext>
+            </a:extLst>
+          </a:blip>
+          <a:srcRect/>
+          <a:stretch>
+            <a:fillRect/>
+          </a:stretch>
+        </p:blipFill>
+        <p:spPr bwMode="auto">
+          <a:xfrm>
+            <a:off x="179512" y="-8632"/>
+            <a:ext cx="1581111" cy="5184626"/>
+          </a:xfrm>
+          <a:prstGeom prst="rect">
+            <a:avLst/>
+          </a:prstGeom>
+          <a:noFill/>
+          <a:ln>
+            <a:noFill/>
+          </a:ln>
+          <a:effectLst/>
+          <a:extLst>
+            <a:ext uri="{909E8E84-426E-40DD-AFC4-6F175D3DCCD1}">
+              <a14:hiddenFill xmlns:a14="http://schemas.microsoft.com/office/drawing/2010/main">
+                <a:solidFill>
+                  <a:schemeClr val="accent1"/>
+                </a:solidFill>
+              </a14:hiddenFill>
+            </a:ext>
+            <a:ext uri="{91240B29-F687-4F45-9708-019B960494DF}">
+              <a14:hiddenLine xmlns:a14="http://schemas.microsoft.com/office/drawing/2010/main" w="9525">
+                <a:solidFill>
+                  <a:schemeClr val="tx1"/>
+                </a:solidFill>
+                <a:miter lim="800000"/>
+                <a:headEnd/>
+                <a:tailEnd/>
+              </a14:hiddenLine>
+            </a:ext>
+            <a:ext uri="{AF507438-7753-43E0-B8FC-AC1667EBCBE1}">
+              <a14:hiddenEffects xmlns:a14="http://schemas.microsoft.com/office/drawing/2010/main">
+                <a:effectLst>
+                  <a:outerShdw dist="35921" dir="2700000" algn="ctr" rotWithShape="0">
+                    <a:schemeClr val="bg2"/>
+                  </a:outerShdw>
+                </a:effectLst>
+              </a14:hiddenEffects>
+            </a:ext>
+          </a:extLst>
+        </p:spPr>
+      </p:pic>
+      <p:pic>
+        <p:nvPicPr>
+          <p:cNvPr id="1030" name="Picture 6"/>
+          <p:cNvPicPr>
+            <a:picLocks noChangeAspect="1" noChangeArrowheads="1"/>
+          </p:cNvPicPr>
+          <p:nvPr/>
+        </p:nvPicPr>
+        <p:blipFill>
+          <a:blip r:embed="rId3">
+            <a:extLst>
+              <a:ext uri="{28A0092B-C50C-407E-A947-70E740481C1C}">
+                <a14:useLocalDpi xmlns:a14="http://schemas.microsoft.com/office/drawing/2010/main" val="0"/>
+              </a:ext>
+            </a:extLst>
+          </a:blip>
+          <a:srcRect/>
+          <a:stretch>
+            <a:fillRect/>
+          </a:stretch>
+        </p:blipFill>
+        <p:spPr bwMode="auto">
+          <a:xfrm>
+            <a:off x="7092280" y="-2331640"/>
+            <a:ext cx="1558246" cy="5184626"/>
+          </a:xfrm>
+          <a:prstGeom prst="rect">
+            <a:avLst/>
+          </a:prstGeom>
+          <a:noFill/>
+          <a:ln>
+            <a:noFill/>
+          </a:ln>
+          <a:effectLst/>
+          <a:extLst>
+            <a:ext uri="{909E8E84-426E-40DD-AFC4-6F175D3DCCD1}">
+              <a14:hiddenFill xmlns:a14="http://schemas.microsoft.com/office/drawing/2010/main">
+                <a:solidFill>
+                  <a:schemeClr val="accent1"/>
+                </a:solidFill>
+              </a14:hiddenFill>
+            </a:ext>
+            <a:ext uri="{91240B29-F687-4F45-9708-019B960494DF}">
+              <a14:hiddenLine xmlns:a14="http://schemas.microsoft.com/office/drawing/2010/main" w="9525">
+                <a:solidFill>
+                  <a:schemeClr val="tx1"/>
+                </a:solidFill>
+                <a:miter lim="800000"/>
+                <a:headEnd/>
+                <a:tailEnd/>
+              </a14:hiddenLine>
+            </a:ext>
+            <a:ext uri="{AF507438-7753-43E0-B8FC-AC1667EBCBE1}">
+              <a14:hiddenEffects xmlns:a14="http://schemas.microsoft.com/office/drawing/2010/main">
+                <a:effectLst>
+                  <a:outerShdw dist="35921" dir="2700000" algn="ctr" rotWithShape="0">
+                    <a:schemeClr val="bg2"/>
+                  </a:outerShdw>
+                </a:effectLst>
+              </a14:hiddenEffects>
+            </a:ext>
+          </a:extLst>
+        </p:spPr>
+      </p:pic>
+      <p:pic>
+        <p:nvPicPr>
+          <p:cNvPr id="1031" name="Picture 7"/>
+          <p:cNvPicPr>
+            <a:picLocks noChangeAspect="1" noChangeArrowheads="1"/>
+          </p:cNvPicPr>
+          <p:nvPr/>
+        </p:nvPicPr>
+        <p:blipFill>
+          <a:blip r:embed="rId4">
+            <a:extLst>
+              <a:ext uri="{28A0092B-C50C-407E-A947-70E740481C1C}">
+                <a14:useLocalDpi xmlns:a14="http://schemas.microsoft.com/office/drawing/2010/main" val="0"/>
+              </a:ext>
+            </a:extLst>
+          </a:blip>
+          <a:srcRect/>
+          <a:stretch>
+            <a:fillRect/>
+          </a:stretch>
+        </p:blipFill>
+        <p:spPr bwMode="auto">
+          <a:xfrm>
+            <a:off x="2200052" y="1340768"/>
+            <a:ext cx="4730750" cy="4962525"/>
+          </a:xfrm>
+          <a:prstGeom prst="rect">
+            <a:avLst/>
+          </a:prstGeom>
+          <a:noFill/>
+          <a:ln>
+            <a:noFill/>
+          </a:ln>
+          <a:effectLst/>
+          <a:extLst>
+            <a:ext uri="{909E8E84-426E-40DD-AFC4-6F175D3DCCD1}">
+              <a14:hiddenFill xmlns:a14="http://schemas.microsoft.com/office/drawing/2010/main">
+                <a:solidFill>
+                  <a:schemeClr val="accent1"/>
+                </a:solidFill>
+              </a14:hiddenFill>
+            </a:ext>
+            <a:ext uri="{91240B29-F687-4F45-9708-019B960494DF}">
+              <a14:hiddenLine xmlns:a14="http://schemas.microsoft.com/office/drawing/2010/main" w="9525">
+                <a:solidFill>
+                  <a:schemeClr val="tx1"/>
+                </a:solidFill>
+                <a:miter lim="800000"/>
+                <a:headEnd/>
+                <a:tailEnd/>
+              </a14:hiddenLine>
+            </a:ext>
+            <a:ext uri="{AF507438-7753-43E0-B8FC-AC1667EBCBE1}">
+              <a14:hiddenEffects xmlns:a14="http://schemas.microsoft.com/office/drawing/2010/main">
+                <a:effectLst>
+                  <a:outerShdw dist="35921" dir="2700000" algn="ctr" rotWithShape="0">
+                    <a:schemeClr val="bg2"/>
+                  </a:outerShdw>
+                </a:effectLst>
+              </a14:hiddenEffects>
+            </a:ext>
+          </a:extLst>
+        </p:spPr>
+      </p:pic>
+      <p:sp>
+        <p:nvSpPr>
+          <p:cNvPr id="2" name="矩形 1"/>
+          <p:cNvSpPr/>
+          <p:nvPr/>
+        </p:nvSpPr>
+        <p:spPr>
+          <a:xfrm>
+            <a:off x="-5005064" y="1548408"/>
+            <a:ext cx="4752528" cy="3600450"/>
+          </a:xfrm>
+          <a:prstGeom prst="rect">
+            <a:avLst/>
+          </a:prstGeom>
+          <a:solidFill>
+            <a:schemeClr val="bg1"/>
+          </a:solidFill>
+          <a:ln>
+            <a:noFill/>
+          </a:ln>
+        </p:spPr>
+        <p:style>
+          <a:lnRef idx="2">
+            <a:schemeClr val="accent1">
+              <a:shade val="50000"/>
+            </a:schemeClr>
+          </a:lnRef>
+          <a:fillRef idx="1">
+            <a:schemeClr val="accent1"/>
+          </a:fillRef>
+          <a:effectRef idx="0">
+            <a:schemeClr val="accent1"/>
+          </a:effectRef>
+          <a:fontRef idx="minor">
+            <a:schemeClr val="lt1"/>
+          </a:fontRef>
+        </p:style>
+        <p:txBody>
+          <a:bodyPr rtlCol="0" anchor="ctr"/>
+          <a:lstStyle/>
+          <a:p>
+            <a:pPr algn="ctr"/>
+            <a:endParaRPr lang="zh-CN" altLang="en-US"/>
+          </a:p>
+        </p:txBody>
+      </p:sp>
+      <p:pic>
+        <p:nvPicPr>
+          <p:cNvPr id="1032" name="Picture 8"/>
+          <p:cNvPicPr>
+            <a:picLocks noChangeAspect="1" noChangeArrowheads="1"/>
+          </p:cNvPicPr>
+          <p:nvPr/>
+        </p:nvPicPr>
+        <p:blipFill>
+          <a:blip r:embed="rId5">
+            <a:extLst>
+              <a:ext uri="{28A0092B-C50C-407E-A947-70E740481C1C}">
+                <a14:useLocalDpi xmlns:a14="http://schemas.microsoft.com/office/drawing/2010/main" val="0"/>
+              </a:ext>
+            </a:extLst>
+          </a:blip>
+          <a:srcRect/>
+          <a:stretch>
+            <a:fillRect/>
+          </a:stretch>
+        </p:blipFill>
+        <p:spPr bwMode="auto">
+          <a:xfrm>
+            <a:off x="7900399" y="2648694"/>
+            <a:ext cx="4657725" cy="5054600"/>
+          </a:xfrm>
+          <a:prstGeom prst="rect">
+            <a:avLst/>
+          </a:prstGeom>
+          <a:noFill/>
+          <a:ln>
+            <a:noFill/>
+          </a:ln>
+          <a:effectLst/>
+          <a:extLst>
+            <a:ext uri="{909E8E84-426E-40DD-AFC4-6F175D3DCCD1}">
+              <a14:hiddenFill xmlns:a14="http://schemas.microsoft.com/office/drawing/2010/main">
+                <a:solidFill>
+                  <a:schemeClr val="accent1"/>
+                </a:solidFill>
+              </a14:hiddenFill>
+            </a:ext>
+            <a:ext uri="{91240B29-F687-4F45-9708-019B960494DF}">
+              <a14:hiddenLine xmlns:a14="http://schemas.microsoft.com/office/drawing/2010/main" w="9525">
+                <a:solidFill>
+                  <a:schemeClr val="tx1"/>
+                </a:solidFill>
+                <a:miter lim="800000"/>
+                <a:headEnd/>
+                <a:tailEnd/>
+              </a14:hiddenLine>
+            </a:ext>
+            <a:ext uri="{AF507438-7753-43E0-B8FC-AC1667EBCBE1}">
+              <a14:hiddenEffects xmlns:a14="http://schemas.microsoft.com/office/drawing/2010/main">
+                <a:effectLst>
+                  <a:outerShdw dist="35921" dir="2700000" algn="ctr" rotWithShape="0">
+                    <a:schemeClr val="bg2"/>
+                  </a:outerShdw>
+                </a:effectLst>
+              </a14:hiddenEffects>
+            </a:ext>
+          </a:extLst>
+        </p:spPr>
+      </p:pic>
     </p:spTree>
     <p:extLst>
       <p:ext uri="{BB962C8B-B14F-4D97-AF65-F5344CB8AC3E}">

</xml_diff>